<commit_message>
chinh sua bao cao
</commit_message>
<xml_diff>
--- a/report/Nhom01_Baocaocuoiki.pptx
+++ b/report/Nhom01_Baocaocuoiki.pptx
@@ -15,10 +15,11 @@
     <p:sldId id="266" r:id="rId9"/>
     <p:sldId id="267" r:id="rId10"/>
     <p:sldId id="268" r:id="rId11"/>
-    <p:sldId id="282" r:id="rId12"/>
-    <p:sldId id="277" r:id="rId13"/>
-    <p:sldId id="287" r:id="rId14"/>
-    <p:sldId id="271" r:id="rId15"/>
+    <p:sldId id="292" r:id="rId12"/>
+    <p:sldId id="282" r:id="rId13"/>
+    <p:sldId id="277" r:id="rId14"/>
+    <p:sldId id="287" r:id="rId15"/>
+    <p:sldId id="271" r:id="rId16"/>
   </p:sldIdLst>
   <p:sldSz cx="12192000" cy="6858000"/>
   <p:notesSz cx="6858000" cy="9144000"/>
@@ -182,7 +183,7 @@
           <a:noFill/>
           <a:extLst>
             <a:ext uri="{909E8E84-426E-40dd-AFC4-6F175D3DCCD1}">
-              <a14:hiddenFill xmlns:a14="http://schemas.microsoft.com/office/drawing/2010/main" xmlns="">
+              <a14:hiddenFill xmlns="" xmlns:a14="http://schemas.microsoft.com/office/drawing/2010/main">
                 <a:solidFill>
                   <a:srgbClr val="FFFFFF"/>
                 </a:solidFill>
@@ -241,7 +242,7 @@
             </a:ln>
             <a:extLst>
               <a:ext uri="{91240B29-F687-4f45-9708-019B960494DF}">
-                <a14:hiddenLine xmlns:a14="http://schemas.microsoft.com/office/drawing/2010/main" xmlns="" w="9525">
+                <a14:hiddenLine xmlns="" xmlns:a14="http://schemas.microsoft.com/office/drawing/2010/main" w="9525">
                   <a:solidFill>
                     <a:srgbClr val="000000"/>
                   </a:solidFill>
@@ -331,7 +332,7 @@
             </a:ln>
             <a:extLst>
               <a:ext uri="{91240B29-F687-4f45-9708-019B960494DF}">
-                <a14:hiddenLine xmlns:a14="http://schemas.microsoft.com/office/drawing/2010/main" xmlns="" w="9525">
+                <a14:hiddenLine xmlns="" xmlns:a14="http://schemas.microsoft.com/office/drawing/2010/main" w="9525">
                   <a:solidFill>
                     <a:srgbClr val="000000"/>
                   </a:solidFill>
@@ -421,7 +422,7 @@
             </a:ln>
             <a:extLst>
               <a:ext uri="{91240B29-F687-4f45-9708-019B960494DF}">
-                <a14:hiddenLine xmlns:a14="http://schemas.microsoft.com/office/drawing/2010/main" xmlns="" w="9525">
+                <a14:hiddenLine xmlns="" xmlns:a14="http://schemas.microsoft.com/office/drawing/2010/main" w="9525">
                   <a:solidFill>
                     <a:srgbClr val="000000"/>
                   </a:solidFill>
@@ -455,7 +456,7 @@
             </a:ln>
             <a:extLst>
               <a:ext uri="{91240B29-F687-4f45-9708-019B960494DF}">
-                <a14:hiddenLine xmlns:a14="http://schemas.microsoft.com/office/drawing/2010/main" xmlns="" w="9525">
+                <a14:hiddenLine xmlns="" xmlns:a14="http://schemas.microsoft.com/office/drawing/2010/main" w="9525">
                   <a:solidFill>
                     <a:srgbClr val="000000"/>
                   </a:solidFill>
@@ -545,7 +546,7 @@
             </a:ln>
             <a:extLst>
               <a:ext uri="{91240B29-F687-4f45-9708-019B960494DF}">
-                <a14:hiddenLine xmlns:a14="http://schemas.microsoft.com/office/drawing/2010/main" xmlns="" w="9525">
+                <a14:hiddenLine xmlns="" xmlns:a14="http://schemas.microsoft.com/office/drawing/2010/main" w="9525">
                   <a:solidFill>
                     <a:srgbClr val="000000"/>
                   </a:solidFill>
@@ -607,7 +608,7 @@
             </a:ln>
             <a:extLst>
               <a:ext uri="{91240B29-F687-4f45-9708-019B960494DF}">
-                <a14:hiddenLine xmlns:a14="http://schemas.microsoft.com/office/drawing/2010/main" xmlns="" w="9525">
+                <a14:hiddenLine xmlns="" xmlns:a14="http://schemas.microsoft.com/office/drawing/2010/main" w="9525">
                   <a:solidFill>
                     <a:srgbClr val="000000"/>
                   </a:solidFill>
@@ -669,7 +670,7 @@
             </a:ln>
             <a:extLst>
               <a:ext uri="{91240B29-F687-4f45-9708-019B960494DF}">
-                <a14:hiddenLine xmlns:a14="http://schemas.microsoft.com/office/drawing/2010/main" xmlns="" w="9525">
+                <a14:hiddenLine xmlns="" xmlns:a14="http://schemas.microsoft.com/office/drawing/2010/main" w="9525">
                   <a:solidFill>
                     <a:srgbClr val="000000"/>
                   </a:solidFill>
@@ -759,7 +760,7 @@
             </a:ln>
             <a:extLst>
               <a:ext uri="{91240B29-F687-4f45-9708-019B960494DF}">
-                <a14:hiddenLine xmlns:a14="http://schemas.microsoft.com/office/drawing/2010/main" xmlns="" w="9525">
+                <a14:hiddenLine xmlns="" xmlns:a14="http://schemas.microsoft.com/office/drawing/2010/main" w="9525">
                   <a:solidFill>
                     <a:srgbClr val="000000"/>
                   </a:solidFill>
@@ -821,7 +822,7 @@
             </a:ln>
             <a:extLst>
               <a:ext uri="{91240B29-F687-4f45-9708-019B960494DF}">
-                <a14:hiddenLine xmlns:a14="http://schemas.microsoft.com/office/drawing/2010/main" xmlns="" w="9525">
+                <a14:hiddenLine xmlns="" xmlns:a14="http://schemas.microsoft.com/office/drawing/2010/main" w="9525">
                   <a:solidFill>
                     <a:srgbClr val="000000"/>
                   </a:solidFill>
@@ -883,7 +884,7 @@
             </a:ln>
             <a:extLst>
               <a:ext uri="{91240B29-F687-4f45-9708-019B960494DF}">
-                <a14:hiddenLine xmlns:a14="http://schemas.microsoft.com/office/drawing/2010/main" xmlns="" w="9525">
+                <a14:hiddenLine xmlns="" xmlns:a14="http://schemas.microsoft.com/office/drawing/2010/main" w="9525">
                   <a:solidFill>
                     <a:srgbClr val="000000"/>
                   </a:solidFill>
@@ -973,7 +974,7 @@
             </a:ln>
             <a:extLst>
               <a:ext uri="{91240B29-F687-4f45-9708-019B960494DF}">
-                <a14:hiddenLine xmlns:a14="http://schemas.microsoft.com/office/drawing/2010/main" xmlns="" w="9525">
+                <a14:hiddenLine xmlns="" xmlns:a14="http://schemas.microsoft.com/office/drawing/2010/main" w="9525">
                   <a:solidFill>
                     <a:srgbClr val="000000"/>
                   </a:solidFill>
@@ -1063,7 +1064,7 @@
             </a:ln>
             <a:extLst>
               <a:ext uri="{91240B29-F687-4f45-9708-019B960494DF}">
-                <a14:hiddenLine xmlns:a14="http://schemas.microsoft.com/office/drawing/2010/main" xmlns="" w="9525">
+                <a14:hiddenLine xmlns="" xmlns:a14="http://schemas.microsoft.com/office/drawing/2010/main" w="9525">
                   <a:solidFill>
                     <a:srgbClr val="000000"/>
                   </a:solidFill>
@@ -1125,7 +1126,7 @@
             </a:ln>
             <a:extLst>
               <a:ext uri="{91240B29-F687-4f45-9708-019B960494DF}">
-                <a14:hiddenLine xmlns:a14="http://schemas.microsoft.com/office/drawing/2010/main" xmlns="" w="9525">
+                <a14:hiddenLine xmlns="" xmlns:a14="http://schemas.microsoft.com/office/drawing/2010/main" w="9525">
                   <a:solidFill>
                     <a:srgbClr val="000000"/>
                   </a:solidFill>
@@ -1235,7 +1236,7 @@
             </a:ln>
             <a:extLst>
               <a:ext uri="{91240B29-F687-4f45-9708-019B960494DF}">
-                <a14:hiddenLine xmlns:a14="http://schemas.microsoft.com/office/drawing/2010/main" xmlns="" w="9525">
+                <a14:hiddenLine xmlns="" xmlns:a14="http://schemas.microsoft.com/office/drawing/2010/main" w="9525">
                   <a:solidFill>
                     <a:srgbClr val="000000"/>
                   </a:solidFill>
@@ -1297,7 +1298,7 @@
             </a:ln>
             <a:extLst>
               <a:ext uri="{91240B29-F687-4f45-9708-019B960494DF}">
-                <a14:hiddenLine xmlns:a14="http://schemas.microsoft.com/office/drawing/2010/main" xmlns="" w="9525">
+                <a14:hiddenLine xmlns="" xmlns:a14="http://schemas.microsoft.com/office/drawing/2010/main" w="9525">
                   <a:solidFill>
                     <a:srgbClr val="000000"/>
                   </a:solidFill>
@@ -1387,7 +1388,7 @@
             </a:ln>
             <a:extLst>
               <a:ext uri="{91240B29-F687-4f45-9708-019B960494DF}">
-                <a14:hiddenLine xmlns:a14="http://schemas.microsoft.com/office/drawing/2010/main" xmlns="" w="9525">
+                <a14:hiddenLine xmlns="" xmlns:a14="http://schemas.microsoft.com/office/drawing/2010/main" w="9525">
                   <a:solidFill>
                     <a:srgbClr val="000000"/>
                   </a:solidFill>
@@ -1477,7 +1478,7 @@
             </a:ln>
             <a:extLst>
               <a:ext uri="{91240B29-F687-4f45-9708-019B960494DF}">
-                <a14:hiddenLine xmlns:a14="http://schemas.microsoft.com/office/drawing/2010/main" xmlns="" w="9525">
+                <a14:hiddenLine xmlns="" xmlns:a14="http://schemas.microsoft.com/office/drawing/2010/main" w="9525">
                   <a:solidFill>
                     <a:srgbClr val="000000"/>
                   </a:solidFill>
@@ -1539,7 +1540,7 @@
             </a:ln>
             <a:extLst>
               <a:ext uri="{91240B29-F687-4f45-9708-019B960494DF}">
-                <a14:hiddenLine xmlns:a14="http://schemas.microsoft.com/office/drawing/2010/main" xmlns="" w="9525">
+                <a14:hiddenLine xmlns="" xmlns:a14="http://schemas.microsoft.com/office/drawing/2010/main" w="9525">
                   <a:solidFill>
                     <a:srgbClr val="000000"/>
                   </a:solidFill>
@@ -1629,7 +1630,7 @@
             </a:ln>
             <a:extLst>
               <a:ext uri="{91240B29-F687-4f45-9708-019B960494DF}">
-                <a14:hiddenLine xmlns:a14="http://schemas.microsoft.com/office/drawing/2010/main" xmlns="" w="9525">
+                <a14:hiddenLine xmlns="" xmlns:a14="http://schemas.microsoft.com/office/drawing/2010/main" w="9525">
                   <a:solidFill>
                     <a:srgbClr val="000000"/>
                   </a:solidFill>
@@ -1719,7 +1720,7 @@
             </a:ln>
             <a:extLst>
               <a:ext uri="{91240B29-F687-4f45-9708-019B960494DF}">
-                <a14:hiddenLine xmlns:a14="http://schemas.microsoft.com/office/drawing/2010/main" xmlns="" w="9525">
+                <a14:hiddenLine xmlns="" xmlns:a14="http://schemas.microsoft.com/office/drawing/2010/main" w="9525">
                   <a:solidFill>
                     <a:srgbClr val="000000"/>
                   </a:solidFill>
@@ -1775,7 +1776,7 @@
             </a:ln>
             <a:extLst>
               <a:ext uri="{91240B29-F687-4f45-9708-019B960494DF}">
-                <a14:hiddenLine xmlns:a14="http://schemas.microsoft.com/office/drawing/2010/main" xmlns="" w="9525">
+                <a14:hiddenLine xmlns="" xmlns:a14="http://schemas.microsoft.com/office/drawing/2010/main" w="9525">
                   <a:solidFill>
                     <a:srgbClr val="000000"/>
                   </a:solidFill>
@@ -1865,7 +1866,7 @@
             </a:ln>
             <a:extLst>
               <a:ext uri="{91240B29-F687-4f45-9708-019B960494DF}">
-                <a14:hiddenLine xmlns:a14="http://schemas.microsoft.com/office/drawing/2010/main" xmlns="" w="9525">
+                <a14:hiddenLine xmlns="" xmlns:a14="http://schemas.microsoft.com/office/drawing/2010/main" w="9525">
                   <a:solidFill>
                     <a:srgbClr val="000000"/>
                   </a:solidFill>
@@ -1921,7 +1922,7 @@
             </a:ln>
             <a:extLst>
               <a:ext uri="{91240B29-F687-4f45-9708-019B960494DF}">
-                <a14:hiddenLine xmlns:a14="http://schemas.microsoft.com/office/drawing/2010/main" xmlns="" w="9525">
+                <a14:hiddenLine xmlns="" xmlns:a14="http://schemas.microsoft.com/office/drawing/2010/main" w="9525">
                   <a:solidFill>
                     <a:srgbClr val="000000"/>
                   </a:solidFill>
@@ -2011,7 +2012,7 @@
             </a:ln>
             <a:extLst>
               <a:ext uri="{91240B29-F687-4f45-9708-019B960494DF}">
-                <a14:hiddenLine xmlns:a14="http://schemas.microsoft.com/office/drawing/2010/main" xmlns="" w="9525">
+                <a14:hiddenLine xmlns="" xmlns:a14="http://schemas.microsoft.com/office/drawing/2010/main" w="9525">
                   <a:solidFill>
                     <a:srgbClr val="000000"/>
                   </a:solidFill>
@@ -2079,7 +2080,7 @@
             </a:ln>
             <a:extLst>
               <a:ext uri="{91240B29-F687-4f45-9708-019B960494DF}">
-                <a14:hiddenLine xmlns:a14="http://schemas.microsoft.com/office/drawing/2010/main" xmlns="" w="9525">
+                <a14:hiddenLine xmlns="" xmlns:a14="http://schemas.microsoft.com/office/drawing/2010/main" w="9525">
                   <a:solidFill>
                     <a:srgbClr val="000000"/>
                   </a:solidFill>
@@ -2169,7 +2170,7 @@
             </a:ln>
             <a:extLst>
               <a:ext uri="{91240B29-F687-4f45-9708-019B960494DF}">
-                <a14:hiddenLine xmlns:a14="http://schemas.microsoft.com/office/drawing/2010/main" xmlns="" w="9525">
+                <a14:hiddenLine xmlns="" xmlns:a14="http://schemas.microsoft.com/office/drawing/2010/main" w="9525">
                   <a:solidFill>
                     <a:srgbClr val="000000"/>
                   </a:solidFill>
@@ -2237,7 +2238,7 @@
             </a:ln>
             <a:extLst>
               <a:ext uri="{91240B29-F687-4f45-9708-019B960494DF}">
-                <a14:hiddenLine xmlns:a14="http://schemas.microsoft.com/office/drawing/2010/main" xmlns="" w="9525">
+                <a14:hiddenLine xmlns="" xmlns:a14="http://schemas.microsoft.com/office/drawing/2010/main" w="9525">
                   <a:solidFill>
                     <a:srgbClr val="000000"/>
                   </a:solidFill>
@@ -2327,7 +2328,7 @@
             </a:ln>
             <a:extLst>
               <a:ext uri="{91240B29-F687-4f45-9708-019B960494DF}">
-                <a14:hiddenLine xmlns:a14="http://schemas.microsoft.com/office/drawing/2010/main" xmlns="" w="9525">
+                <a14:hiddenLine xmlns="" xmlns:a14="http://schemas.microsoft.com/office/drawing/2010/main" w="9525">
                   <a:solidFill>
                     <a:srgbClr val="000000"/>
                   </a:solidFill>
@@ -2361,7 +2362,7 @@
             </a:ln>
             <a:extLst>
               <a:ext uri="{91240B29-F687-4f45-9708-019B960494DF}">
-                <a14:hiddenLine xmlns:a14="http://schemas.microsoft.com/office/drawing/2010/main" xmlns="" w="9525">
+                <a14:hiddenLine xmlns="" xmlns:a14="http://schemas.microsoft.com/office/drawing/2010/main" w="9525">
                   <a:solidFill>
                     <a:srgbClr val="000000"/>
                   </a:solidFill>
@@ -2451,7 +2452,7 @@
             </a:ln>
             <a:extLst>
               <a:ext uri="{91240B29-F687-4f45-9708-019B960494DF}">
-                <a14:hiddenLine xmlns:a14="http://schemas.microsoft.com/office/drawing/2010/main" xmlns="" w="9525">
+                <a14:hiddenLine xmlns="" xmlns:a14="http://schemas.microsoft.com/office/drawing/2010/main" w="9525">
                   <a:solidFill>
                     <a:srgbClr val="000000"/>
                   </a:solidFill>
@@ -2513,7 +2514,7 @@
             </a:ln>
             <a:extLst>
               <a:ext uri="{91240B29-F687-4f45-9708-019B960494DF}">
-                <a14:hiddenLine xmlns:a14="http://schemas.microsoft.com/office/drawing/2010/main" xmlns="" w="9525">
+                <a14:hiddenLine xmlns="" xmlns:a14="http://schemas.microsoft.com/office/drawing/2010/main" w="9525">
                   <a:solidFill>
                     <a:srgbClr val="000000"/>
                   </a:solidFill>
@@ -2575,7 +2576,7 @@
             </a:ln>
             <a:extLst>
               <a:ext uri="{91240B29-F687-4f45-9708-019B960494DF}">
-                <a14:hiddenLine xmlns:a14="http://schemas.microsoft.com/office/drawing/2010/main" xmlns="" w="9525">
+                <a14:hiddenLine xmlns="" xmlns:a14="http://schemas.microsoft.com/office/drawing/2010/main" w="9525">
                   <a:solidFill>
                     <a:srgbClr val="000000"/>
                   </a:solidFill>
@@ -2665,7 +2666,7 @@
             </a:ln>
             <a:extLst>
               <a:ext uri="{91240B29-F687-4f45-9708-019B960494DF}">
-                <a14:hiddenLine xmlns:a14="http://schemas.microsoft.com/office/drawing/2010/main" xmlns="" w="9525">
+                <a14:hiddenLine xmlns="" xmlns:a14="http://schemas.microsoft.com/office/drawing/2010/main" w="9525">
                   <a:solidFill>
                     <a:srgbClr val="000000"/>
                   </a:solidFill>
@@ -2733,7 +2734,7 @@
             </a:ln>
             <a:extLst>
               <a:ext uri="{91240B29-F687-4f45-9708-019B960494DF}">
-                <a14:hiddenLine xmlns:a14="http://schemas.microsoft.com/office/drawing/2010/main" xmlns="" w="9525">
+                <a14:hiddenLine xmlns="" xmlns:a14="http://schemas.microsoft.com/office/drawing/2010/main" w="9525">
                   <a:solidFill>
                     <a:srgbClr val="000000"/>
                   </a:solidFill>
@@ -2795,7 +2796,7 @@
             </a:ln>
             <a:extLst>
               <a:ext uri="{91240B29-F687-4f45-9708-019B960494DF}">
-                <a14:hiddenLine xmlns:a14="http://schemas.microsoft.com/office/drawing/2010/main" xmlns="" w="9525">
+                <a14:hiddenLine xmlns="" xmlns:a14="http://schemas.microsoft.com/office/drawing/2010/main" w="9525">
                   <a:solidFill>
                     <a:srgbClr val="000000"/>
                   </a:solidFill>
@@ -2885,7 +2886,7 @@
             </a:ln>
             <a:extLst>
               <a:ext uri="{91240B29-F687-4f45-9708-019B960494DF}">
-                <a14:hiddenLine xmlns:a14="http://schemas.microsoft.com/office/drawing/2010/main" xmlns="" w="9525">
+                <a14:hiddenLine xmlns="" xmlns:a14="http://schemas.microsoft.com/office/drawing/2010/main" w="9525">
                   <a:solidFill>
                     <a:srgbClr val="000000"/>
                   </a:solidFill>
@@ -2947,7 +2948,7 @@
             </a:ln>
             <a:extLst>
               <a:ext uri="{91240B29-F687-4f45-9708-019B960494DF}">
-                <a14:hiddenLine xmlns:a14="http://schemas.microsoft.com/office/drawing/2010/main" xmlns="" w="9525">
+                <a14:hiddenLine xmlns="" xmlns:a14="http://schemas.microsoft.com/office/drawing/2010/main" w="9525">
                   <a:solidFill>
                     <a:srgbClr val="000000"/>
                   </a:solidFill>
@@ -3037,7 +3038,7 @@
             </a:ln>
             <a:extLst>
               <a:ext uri="{91240B29-F687-4f45-9708-019B960494DF}">
-                <a14:hiddenLine xmlns:a14="http://schemas.microsoft.com/office/drawing/2010/main" xmlns="" w="9525">
+                <a14:hiddenLine xmlns="" xmlns:a14="http://schemas.microsoft.com/office/drawing/2010/main" w="9525">
                   <a:solidFill>
                     <a:srgbClr val="000000"/>
                   </a:solidFill>
@@ -3099,7 +3100,7 @@
             </a:ln>
             <a:extLst>
               <a:ext uri="{91240B29-F687-4f45-9708-019B960494DF}">
-                <a14:hiddenLine xmlns:a14="http://schemas.microsoft.com/office/drawing/2010/main" xmlns="" w="9525">
+                <a14:hiddenLine xmlns="" xmlns:a14="http://schemas.microsoft.com/office/drawing/2010/main" w="9525">
                   <a:solidFill>
                     <a:srgbClr val="000000"/>
                   </a:solidFill>
@@ -3189,7 +3190,7 @@
             </a:ln>
             <a:extLst>
               <a:ext uri="{91240B29-F687-4f45-9708-019B960494DF}">
-                <a14:hiddenLine xmlns:a14="http://schemas.microsoft.com/office/drawing/2010/main" xmlns="" w="9525">
+                <a14:hiddenLine xmlns="" xmlns:a14="http://schemas.microsoft.com/office/drawing/2010/main" w="9525">
                   <a:solidFill>
                     <a:srgbClr val="000000"/>
                   </a:solidFill>
@@ -3223,7 +3224,7 @@
             </a:ln>
             <a:extLst>
               <a:ext uri="{91240B29-F687-4f45-9708-019B960494DF}">
-                <a14:hiddenLine xmlns:a14="http://schemas.microsoft.com/office/drawing/2010/main" xmlns="" w="9525">
+                <a14:hiddenLine xmlns="" xmlns:a14="http://schemas.microsoft.com/office/drawing/2010/main" w="9525">
                   <a:solidFill>
                     <a:srgbClr val="000000"/>
                   </a:solidFill>
@@ -3288,7 +3289,7 @@
             </a:ln>
             <a:extLst>
               <a:ext uri="{91240B29-F687-4f45-9708-019B960494DF}">
-                <a14:hiddenLine xmlns:a14="http://schemas.microsoft.com/office/drawing/2010/main" xmlns="" w="9525">
+                <a14:hiddenLine xmlns="" xmlns:a14="http://schemas.microsoft.com/office/drawing/2010/main" w="9525">
                   <a:solidFill>
                     <a:srgbClr val="000000"/>
                   </a:solidFill>
@@ -3378,7 +3379,7 @@
             </a:ln>
             <a:extLst>
               <a:ext uri="{91240B29-F687-4f45-9708-019B960494DF}">
-                <a14:hiddenLine xmlns:a14="http://schemas.microsoft.com/office/drawing/2010/main" xmlns="" w="9525">
+                <a14:hiddenLine xmlns="" xmlns:a14="http://schemas.microsoft.com/office/drawing/2010/main" w="9525">
                   <a:solidFill>
                     <a:srgbClr val="000000"/>
                   </a:solidFill>
@@ -3440,7 +3441,7 @@
             </a:ln>
             <a:extLst>
               <a:ext uri="{91240B29-F687-4f45-9708-019B960494DF}">
-                <a14:hiddenLine xmlns:a14="http://schemas.microsoft.com/office/drawing/2010/main" xmlns="" w="9525">
+                <a14:hiddenLine xmlns="" xmlns:a14="http://schemas.microsoft.com/office/drawing/2010/main" w="9525">
                   <a:solidFill>
                     <a:srgbClr val="000000"/>
                   </a:solidFill>
@@ -3530,7 +3531,7 @@
             </a:ln>
             <a:extLst>
               <a:ext uri="{91240B29-F687-4f45-9708-019B960494DF}">
-                <a14:hiddenLine xmlns:a14="http://schemas.microsoft.com/office/drawing/2010/main" xmlns="" w="9525">
+                <a14:hiddenLine xmlns="" xmlns:a14="http://schemas.microsoft.com/office/drawing/2010/main" w="9525">
                   <a:solidFill>
                     <a:srgbClr val="000000"/>
                   </a:solidFill>
@@ -3620,7 +3621,7 @@
             </a:ln>
             <a:extLst>
               <a:ext uri="{91240B29-F687-4f45-9708-019B960494DF}">
-                <a14:hiddenLine xmlns:a14="http://schemas.microsoft.com/office/drawing/2010/main" xmlns="" w="9525">
+                <a14:hiddenLine xmlns="" xmlns:a14="http://schemas.microsoft.com/office/drawing/2010/main" w="9525">
                   <a:solidFill>
                     <a:srgbClr val="000000"/>
                   </a:solidFill>
@@ -3685,7 +3686,7 @@
             </a:ln>
             <a:extLst>
               <a:ext uri="{91240B29-F687-4f45-9708-019B960494DF}">
-                <a14:hiddenLine xmlns:a14="http://schemas.microsoft.com/office/drawing/2010/main" xmlns="" w="9525">
+                <a14:hiddenLine xmlns="" xmlns:a14="http://schemas.microsoft.com/office/drawing/2010/main" w="9525">
                   <a:solidFill>
                     <a:srgbClr val="000000"/>
                   </a:solidFill>
@@ -3747,7 +3748,7 @@
             </a:ln>
             <a:extLst>
               <a:ext uri="{91240B29-F687-4f45-9708-019B960494DF}">
-                <a14:hiddenLine xmlns:a14="http://schemas.microsoft.com/office/drawing/2010/main" xmlns="" w="9525">
+                <a14:hiddenLine xmlns="" xmlns:a14="http://schemas.microsoft.com/office/drawing/2010/main" w="9525">
                   <a:solidFill>
                     <a:srgbClr val="000000"/>
                   </a:solidFill>
@@ -3837,7 +3838,7 @@
             </a:ln>
             <a:extLst>
               <a:ext uri="{91240B29-F687-4f45-9708-019B960494DF}">
-                <a14:hiddenLine xmlns:a14="http://schemas.microsoft.com/office/drawing/2010/main" xmlns="" w="9525">
+                <a14:hiddenLine xmlns="" xmlns:a14="http://schemas.microsoft.com/office/drawing/2010/main" w="9525">
                   <a:solidFill>
                     <a:srgbClr val="000000"/>
                   </a:solidFill>
@@ -3927,7 +3928,7 @@
             </a:ln>
             <a:extLst>
               <a:ext uri="{91240B29-F687-4f45-9708-019B960494DF}">
-                <a14:hiddenLine xmlns:a14="http://schemas.microsoft.com/office/drawing/2010/main" xmlns="" w="9525">
+                <a14:hiddenLine xmlns="" xmlns:a14="http://schemas.microsoft.com/office/drawing/2010/main" w="9525">
                   <a:solidFill>
                     <a:srgbClr val="000000"/>
                   </a:solidFill>
@@ -3989,7 +3990,7 @@
             </a:ln>
             <a:extLst>
               <a:ext uri="{91240B29-F687-4f45-9708-019B960494DF}">
-                <a14:hiddenLine xmlns:a14="http://schemas.microsoft.com/office/drawing/2010/main" xmlns="" w="9525">
+                <a14:hiddenLine xmlns="" xmlns:a14="http://schemas.microsoft.com/office/drawing/2010/main" w="9525">
                   <a:solidFill>
                     <a:srgbClr val="000000"/>
                   </a:solidFill>
@@ -4109,7 +4110,7 @@
             </a:ln>
             <a:extLst>
               <a:ext uri="{91240B29-F687-4f45-9708-019B960494DF}">
-                <a14:hiddenLine xmlns:a14="http://schemas.microsoft.com/office/drawing/2010/main" xmlns="" w="9525">
+                <a14:hiddenLine xmlns="" xmlns:a14="http://schemas.microsoft.com/office/drawing/2010/main" w="9525">
                   <a:solidFill>
                     <a:srgbClr val="000000"/>
                   </a:solidFill>
@@ -4177,7 +4178,7 @@
             </a:ln>
             <a:extLst>
               <a:ext uri="{91240B29-F687-4f45-9708-019B960494DF}">
-                <a14:hiddenLine xmlns:a14="http://schemas.microsoft.com/office/drawing/2010/main" xmlns="" w="9525">
+                <a14:hiddenLine xmlns="" xmlns:a14="http://schemas.microsoft.com/office/drawing/2010/main" w="9525">
                   <a:solidFill>
                     <a:srgbClr val="000000"/>
                   </a:solidFill>
@@ -4267,7 +4268,7 @@
             </a:ln>
             <a:extLst>
               <a:ext uri="{91240B29-F687-4f45-9708-019B960494DF}">
-                <a14:hiddenLine xmlns:a14="http://schemas.microsoft.com/office/drawing/2010/main" xmlns="" w="9525">
+                <a14:hiddenLine xmlns="" xmlns:a14="http://schemas.microsoft.com/office/drawing/2010/main" w="9525">
                   <a:solidFill>
                     <a:srgbClr val="000000"/>
                   </a:solidFill>
@@ -4407,7 +4408,7 @@
           <a:p>
             <a:fld id="{48A87A34-81AB-432B-8DAE-1953F412C126}" type="datetimeFigureOut">
               <a:rPr lang="en-US" dirty="0"/>
-              <a:t>12/16/2021</a:t>
+              <a:t>12/22/2021</a:t>
             </a:fld>
             <a:endParaRPr lang="en-US" dirty="0"/>
           </a:p>
@@ -4669,7 +4670,7 @@
           <a:p>
             <a:fld id="{48A87A34-81AB-432B-8DAE-1953F412C126}" type="datetimeFigureOut">
               <a:rPr lang="en-US" dirty="0"/>
-              <a:t>12/16/2021</a:t>
+              <a:t>12/22/2021</a:t>
             </a:fld>
             <a:endParaRPr lang="en-US" dirty="0"/>
           </a:p>
@@ -4860,7 +4861,7 @@
           <a:p>
             <a:fld id="{48A87A34-81AB-432B-8DAE-1953F412C126}" type="datetimeFigureOut">
               <a:rPr lang="en-US" dirty="0"/>
-              <a:t>12/16/2021</a:t>
+              <a:t>12/22/2021</a:t>
             </a:fld>
             <a:endParaRPr lang="en-US" dirty="0"/>
           </a:p>
@@ -5118,7 +5119,7 @@
           <a:p>
             <a:fld id="{48A87A34-81AB-432B-8DAE-1953F412C126}" type="datetimeFigureOut">
               <a:rPr lang="en-US" dirty="0"/>
-              <a:t>12/16/2021</a:t>
+              <a:t>12/22/2021</a:t>
             </a:fld>
             <a:endParaRPr lang="en-US" dirty="0"/>
           </a:p>
@@ -5547,7 +5548,7 @@
           <a:p>
             <a:fld id="{48A87A34-81AB-432B-8DAE-1953F412C126}" type="datetimeFigureOut">
               <a:rPr lang="en-US" dirty="0"/>
-              <a:t>12/16/2021</a:t>
+              <a:t>12/22/2021</a:t>
             </a:fld>
             <a:endParaRPr lang="en-US" dirty="0"/>
           </a:p>
@@ -6088,7 +6089,7 @@
           <a:p>
             <a:fld id="{48A87A34-81AB-432B-8DAE-1953F412C126}" type="datetimeFigureOut">
               <a:rPr lang="en-US" dirty="0"/>
-              <a:t>12/16/2021</a:t>
+              <a:t>12/22/2021</a:t>
             </a:fld>
             <a:endParaRPr lang="en-US" dirty="0"/>
           </a:p>
@@ -6803,7 +6804,7 @@
           <a:p>
             <a:fld id="{48A87A34-81AB-432B-8DAE-1953F412C126}" type="datetimeFigureOut">
               <a:rPr lang="en-US" dirty="0"/>
-              <a:t>12/16/2021</a:t>
+              <a:t>12/22/2021</a:t>
             </a:fld>
             <a:endParaRPr lang="en-US" dirty="0"/>
           </a:p>
@@ -6968,7 +6969,7 @@
           <a:p>
             <a:fld id="{48A87A34-81AB-432B-8DAE-1953F412C126}" type="datetimeFigureOut">
               <a:rPr lang="en-US" dirty="0"/>
-              <a:t>12/16/2021</a:t>
+              <a:t>12/22/2021</a:t>
             </a:fld>
             <a:endParaRPr lang="en-US" dirty="0"/>
           </a:p>
@@ -7143,7 +7144,7 @@
           <a:p>
             <a:fld id="{48A87A34-81AB-432B-8DAE-1953F412C126}" type="datetimeFigureOut">
               <a:rPr lang="en-US" dirty="0"/>
-              <a:t>12/16/2021</a:t>
+              <a:t>12/22/2021</a:t>
             </a:fld>
             <a:endParaRPr lang="en-US" dirty="0"/>
           </a:p>
@@ -7308,7 +7309,7 @@
           <a:p>
             <a:fld id="{48A87A34-81AB-432B-8DAE-1953F412C126}" type="datetimeFigureOut">
               <a:rPr lang="en-US" dirty="0"/>
-              <a:t>12/16/2021</a:t>
+              <a:t>12/22/2021</a:t>
             </a:fld>
             <a:endParaRPr lang="en-US" dirty="0"/>
           </a:p>
@@ -7553,7 +7554,7 @@
           <a:p>
             <a:fld id="{48A87A34-81AB-432B-8DAE-1953F412C126}" type="datetimeFigureOut">
               <a:rPr lang="en-US" dirty="0"/>
-              <a:t>12/16/2021</a:t>
+              <a:t>12/22/2021</a:t>
             </a:fld>
             <a:endParaRPr lang="en-US" dirty="0"/>
           </a:p>
@@ -7780,7 +7781,7 @@
           <a:p>
             <a:fld id="{48A87A34-81AB-432B-8DAE-1953F412C126}" type="datetimeFigureOut">
               <a:rPr lang="en-US" dirty="0"/>
-              <a:t>12/16/2021</a:t>
+              <a:t>12/22/2021</a:t>
             </a:fld>
             <a:endParaRPr lang="en-US" dirty="0"/>
           </a:p>
@@ -8156,7 +8157,7 @@
           <a:p>
             <a:fld id="{48A87A34-81AB-432B-8DAE-1953F412C126}" type="datetimeFigureOut">
               <a:rPr lang="en-US" dirty="0"/>
-              <a:t>12/16/2021</a:t>
+              <a:t>12/22/2021</a:t>
             </a:fld>
             <a:endParaRPr lang="en-US" dirty="0"/>
           </a:p>
@@ -8269,7 +8270,7 @@
           <a:p>
             <a:fld id="{48A87A34-81AB-432B-8DAE-1953F412C126}" type="datetimeFigureOut">
               <a:rPr lang="en-US" dirty="0"/>
-              <a:t>12/16/2021</a:t>
+              <a:t>12/22/2021</a:t>
             </a:fld>
             <a:endParaRPr lang="en-US" dirty="0"/>
           </a:p>
@@ -8359,7 +8360,7 @@
           <a:p>
             <a:fld id="{48A87A34-81AB-432B-8DAE-1953F412C126}" type="datetimeFigureOut">
               <a:rPr lang="en-US" dirty="0"/>
-              <a:t>12/16/2021</a:t>
+              <a:t>12/22/2021</a:t>
             </a:fld>
             <a:endParaRPr lang="en-US" dirty="0"/>
           </a:p>
@@ -8603,7 +8604,7 @@
           <a:p>
             <a:fld id="{48A87A34-81AB-432B-8DAE-1953F412C126}" type="datetimeFigureOut">
               <a:rPr lang="en-US" dirty="0"/>
-              <a:t>12/16/2021</a:t>
+              <a:t>12/22/2021</a:t>
             </a:fld>
             <a:endParaRPr lang="en-US" dirty="0"/>
           </a:p>
@@ -8878,7 +8879,7 @@
           <a:p>
             <a:fld id="{48A87A34-81AB-432B-8DAE-1953F412C126}" type="datetimeFigureOut">
               <a:rPr lang="en-US" dirty="0"/>
-              <a:t>12/16/2021</a:t>
+              <a:t>12/22/2021</a:t>
             </a:fld>
             <a:endParaRPr lang="en-US" dirty="0"/>
           </a:p>
@@ -8996,7 +8997,7 @@
           <a:noFill/>
           <a:extLst>
             <a:ext uri="{909E8E84-426E-40dd-AFC4-6F175D3DCCD1}">
-              <a14:hiddenFill xmlns:a14="http://schemas.microsoft.com/office/drawing/2010/main" xmlns="">
+              <a14:hiddenFill xmlns="" xmlns:a14="http://schemas.microsoft.com/office/drawing/2010/main">
                 <a:solidFill>
                   <a:srgbClr val="FFFFFF"/>
                 </a:solidFill>
@@ -9070,7 +9071,7 @@
               </a:ln>
               <a:extLst>
                 <a:ext uri="{91240B29-F687-4f45-9708-019B960494DF}">
-                  <a14:hiddenLine xmlns:a14="http://schemas.microsoft.com/office/drawing/2010/main" xmlns="" w="9525">
+                  <a14:hiddenLine xmlns="" xmlns:a14="http://schemas.microsoft.com/office/drawing/2010/main" w="9525">
                     <a:solidFill>
                       <a:srgbClr val="000000"/>
                     </a:solidFill>
@@ -9160,7 +9161,7 @@
               </a:ln>
               <a:extLst>
                 <a:ext uri="{91240B29-F687-4f45-9708-019B960494DF}">
-                  <a14:hiddenLine xmlns:a14="http://schemas.microsoft.com/office/drawing/2010/main" xmlns="" w="9525">
+                  <a14:hiddenLine xmlns="" xmlns:a14="http://schemas.microsoft.com/office/drawing/2010/main" w="9525">
                     <a:solidFill>
                       <a:srgbClr val="000000"/>
                     </a:solidFill>
@@ -9250,7 +9251,7 @@
               </a:ln>
               <a:extLst>
                 <a:ext uri="{91240B29-F687-4f45-9708-019B960494DF}">
-                  <a14:hiddenLine xmlns:a14="http://schemas.microsoft.com/office/drawing/2010/main" xmlns="" w="9525">
+                  <a14:hiddenLine xmlns="" xmlns:a14="http://schemas.microsoft.com/office/drawing/2010/main" w="9525">
                     <a:solidFill>
                       <a:srgbClr val="000000"/>
                     </a:solidFill>
@@ -9312,7 +9313,7 @@
               </a:ln>
               <a:extLst>
                 <a:ext uri="{91240B29-F687-4f45-9708-019B960494DF}">
-                  <a14:hiddenLine xmlns:a14="http://schemas.microsoft.com/office/drawing/2010/main" xmlns="" w="9525">
+                  <a14:hiddenLine xmlns="" xmlns:a14="http://schemas.microsoft.com/office/drawing/2010/main" w="9525">
                     <a:solidFill>
                       <a:srgbClr val="000000"/>
                     </a:solidFill>
@@ -9402,7 +9403,7 @@
               </a:ln>
               <a:extLst>
                 <a:ext uri="{91240B29-F687-4f45-9708-019B960494DF}">
-                  <a14:hiddenLine xmlns:a14="http://schemas.microsoft.com/office/drawing/2010/main" xmlns="" w="9525">
+                  <a14:hiddenLine xmlns="" xmlns:a14="http://schemas.microsoft.com/office/drawing/2010/main" w="9525">
                     <a:solidFill>
                       <a:srgbClr val="000000"/>
                     </a:solidFill>
@@ -9464,7 +9465,7 @@
               </a:ln>
               <a:extLst>
                 <a:ext uri="{91240B29-F687-4f45-9708-019B960494DF}">
-                  <a14:hiddenLine xmlns:a14="http://schemas.microsoft.com/office/drawing/2010/main" xmlns="" w="9525">
+                  <a14:hiddenLine xmlns="" xmlns:a14="http://schemas.microsoft.com/office/drawing/2010/main" w="9525">
                     <a:solidFill>
                       <a:srgbClr val="000000"/>
                     </a:solidFill>
@@ -9526,7 +9527,7 @@
               </a:ln>
               <a:extLst>
                 <a:ext uri="{91240B29-F687-4f45-9708-019B960494DF}">
-                  <a14:hiddenLine xmlns:a14="http://schemas.microsoft.com/office/drawing/2010/main" xmlns="" w="9525">
+                  <a14:hiddenLine xmlns="" xmlns:a14="http://schemas.microsoft.com/office/drawing/2010/main" w="9525">
                     <a:solidFill>
                       <a:srgbClr val="000000"/>
                     </a:solidFill>
@@ -9616,7 +9617,7 @@
               </a:ln>
               <a:extLst>
                 <a:ext uri="{91240B29-F687-4f45-9708-019B960494DF}">
-                  <a14:hiddenLine xmlns:a14="http://schemas.microsoft.com/office/drawing/2010/main" xmlns="" w="9525">
+                  <a14:hiddenLine xmlns="" xmlns:a14="http://schemas.microsoft.com/office/drawing/2010/main" w="9525">
                     <a:solidFill>
                       <a:srgbClr val="000000"/>
                     </a:solidFill>
@@ -9706,7 +9707,7 @@
               </a:ln>
               <a:extLst>
                 <a:ext uri="{91240B29-F687-4f45-9708-019B960494DF}">
-                  <a14:hiddenLine xmlns:a14="http://schemas.microsoft.com/office/drawing/2010/main" xmlns="" w="9525">
+                  <a14:hiddenLine xmlns="" xmlns:a14="http://schemas.microsoft.com/office/drawing/2010/main" w="9525">
                     <a:solidFill>
                       <a:srgbClr val="000000"/>
                     </a:solidFill>
@@ -9768,7 +9769,7 @@
               </a:ln>
               <a:extLst>
                 <a:ext uri="{91240B29-F687-4f45-9708-019B960494DF}">
-                  <a14:hiddenLine xmlns:a14="http://schemas.microsoft.com/office/drawing/2010/main" xmlns="" w="9525">
+                  <a14:hiddenLine xmlns="" xmlns:a14="http://schemas.microsoft.com/office/drawing/2010/main" w="9525">
                     <a:solidFill>
                       <a:srgbClr val="000000"/>
                     </a:solidFill>
@@ -9878,7 +9879,7 @@
               </a:ln>
               <a:extLst>
                 <a:ext uri="{91240B29-F687-4f45-9708-019B960494DF}">
-                  <a14:hiddenLine xmlns:a14="http://schemas.microsoft.com/office/drawing/2010/main" xmlns="" w="9525">
+                  <a14:hiddenLine xmlns="" xmlns:a14="http://schemas.microsoft.com/office/drawing/2010/main" w="9525">
                     <a:solidFill>
                       <a:srgbClr val="000000"/>
                     </a:solidFill>
@@ -9962,7 +9963,7 @@
               </a:ln>
               <a:extLst>
                 <a:ext uri="{91240B29-F687-4f45-9708-019B960494DF}">
-                  <a14:hiddenLine xmlns:a14="http://schemas.microsoft.com/office/drawing/2010/main" xmlns="" w="9525">
+                  <a14:hiddenLine xmlns="" xmlns:a14="http://schemas.microsoft.com/office/drawing/2010/main" w="9525">
                     <a:solidFill>
                       <a:srgbClr val="000000"/>
                     </a:solidFill>
@@ -10024,7 +10025,7 @@
               </a:ln>
               <a:extLst>
                 <a:ext uri="{91240B29-F687-4f45-9708-019B960494DF}">
-                  <a14:hiddenLine xmlns:a14="http://schemas.microsoft.com/office/drawing/2010/main" xmlns="" w="9525">
+                  <a14:hiddenLine xmlns="" xmlns:a14="http://schemas.microsoft.com/office/drawing/2010/main" w="9525">
                     <a:solidFill>
                       <a:srgbClr val="000000"/>
                     </a:solidFill>
@@ -10086,7 +10087,7 @@
               </a:ln>
               <a:extLst>
                 <a:ext uri="{91240B29-F687-4f45-9708-019B960494DF}">
-                  <a14:hiddenLine xmlns:a14="http://schemas.microsoft.com/office/drawing/2010/main" xmlns="" w="9525">
+                  <a14:hiddenLine xmlns="" xmlns:a14="http://schemas.microsoft.com/office/drawing/2010/main" w="9525">
                     <a:solidFill>
                       <a:srgbClr val="000000"/>
                     </a:solidFill>
@@ -10176,7 +10177,7 @@
               </a:ln>
               <a:extLst>
                 <a:ext uri="{91240B29-F687-4f45-9708-019B960494DF}">
-                  <a14:hiddenLine xmlns:a14="http://schemas.microsoft.com/office/drawing/2010/main" xmlns="" w="9525">
+                  <a14:hiddenLine xmlns="" xmlns:a14="http://schemas.microsoft.com/office/drawing/2010/main" w="9525">
                     <a:solidFill>
                       <a:srgbClr val="000000"/>
                     </a:solidFill>
@@ -10210,7 +10211,7 @@
               </a:ln>
               <a:extLst>
                 <a:ext uri="{91240B29-F687-4f45-9708-019B960494DF}">
-                  <a14:hiddenLine xmlns:a14="http://schemas.microsoft.com/office/drawing/2010/main" xmlns="" w="9525">
+                  <a14:hiddenLine xmlns="" xmlns:a14="http://schemas.microsoft.com/office/drawing/2010/main" w="9525">
                     <a:solidFill>
                       <a:srgbClr val="000000"/>
                     </a:solidFill>
@@ -10275,7 +10276,7 @@
               </a:ln>
               <a:extLst>
                 <a:ext uri="{91240B29-F687-4f45-9708-019B960494DF}">
-                  <a14:hiddenLine xmlns:a14="http://schemas.microsoft.com/office/drawing/2010/main" xmlns="" w="9525">
+                  <a14:hiddenLine xmlns="" xmlns:a14="http://schemas.microsoft.com/office/drawing/2010/main" w="9525">
                     <a:solidFill>
                       <a:srgbClr val="000000"/>
                     </a:solidFill>
@@ -10365,7 +10366,7 @@
               </a:ln>
               <a:extLst>
                 <a:ext uri="{91240B29-F687-4f45-9708-019B960494DF}">
-                  <a14:hiddenLine xmlns:a14="http://schemas.microsoft.com/office/drawing/2010/main" xmlns="" w="9525">
+                  <a14:hiddenLine xmlns="" xmlns:a14="http://schemas.microsoft.com/office/drawing/2010/main" w="9525">
                     <a:solidFill>
                       <a:srgbClr val="000000"/>
                     </a:solidFill>
@@ -10427,7 +10428,7 @@
               </a:ln>
               <a:extLst>
                 <a:ext uri="{91240B29-F687-4f45-9708-019B960494DF}">
-                  <a14:hiddenLine xmlns:a14="http://schemas.microsoft.com/office/drawing/2010/main" xmlns="" w="9525">
+                  <a14:hiddenLine xmlns="" xmlns:a14="http://schemas.microsoft.com/office/drawing/2010/main" w="9525">
                     <a:solidFill>
                       <a:srgbClr val="000000"/>
                     </a:solidFill>
@@ -10517,7 +10518,7 @@
               </a:ln>
               <a:extLst>
                 <a:ext uri="{91240B29-F687-4f45-9708-019B960494DF}">
-                  <a14:hiddenLine xmlns:a14="http://schemas.microsoft.com/office/drawing/2010/main" xmlns="" w="9525">
+                  <a14:hiddenLine xmlns="" xmlns:a14="http://schemas.microsoft.com/office/drawing/2010/main" w="9525">
                     <a:solidFill>
                       <a:srgbClr val="000000"/>
                     </a:solidFill>
@@ -10582,7 +10583,7 @@
               </a:ln>
               <a:extLst>
                 <a:ext uri="{91240B29-F687-4f45-9708-019B960494DF}">
-                  <a14:hiddenLine xmlns:a14="http://schemas.microsoft.com/office/drawing/2010/main" xmlns="" w="9525">
+                  <a14:hiddenLine xmlns="" xmlns:a14="http://schemas.microsoft.com/office/drawing/2010/main" w="9525">
                     <a:solidFill>
                       <a:srgbClr val="000000"/>
                     </a:solidFill>
@@ -10644,7 +10645,7 @@
               </a:ln>
               <a:extLst>
                 <a:ext uri="{91240B29-F687-4f45-9708-019B960494DF}">
-                  <a14:hiddenLine xmlns:a14="http://schemas.microsoft.com/office/drawing/2010/main" xmlns="" w="9525">
+                  <a14:hiddenLine xmlns="" xmlns:a14="http://schemas.microsoft.com/office/drawing/2010/main" w="9525">
                     <a:solidFill>
                       <a:srgbClr val="000000"/>
                     </a:solidFill>
@@ -10734,7 +10735,7 @@
               </a:ln>
               <a:extLst>
                 <a:ext uri="{91240B29-F687-4f45-9708-019B960494DF}">
-                  <a14:hiddenLine xmlns:a14="http://schemas.microsoft.com/office/drawing/2010/main" xmlns="" w="9525">
+                  <a14:hiddenLine xmlns="" xmlns:a14="http://schemas.microsoft.com/office/drawing/2010/main" w="9525">
                     <a:solidFill>
                       <a:srgbClr val="000000"/>
                     </a:solidFill>
@@ -10824,7 +10825,7 @@
               </a:ln>
               <a:extLst>
                 <a:ext uri="{91240B29-F687-4f45-9708-019B960494DF}">
-                  <a14:hiddenLine xmlns:a14="http://schemas.microsoft.com/office/drawing/2010/main" xmlns="" w="9525">
+                  <a14:hiddenLine xmlns="" xmlns:a14="http://schemas.microsoft.com/office/drawing/2010/main" w="9525">
                     <a:solidFill>
                       <a:srgbClr val="000000"/>
                     </a:solidFill>
@@ -10889,7 +10890,7 @@
               </a:ln>
               <a:extLst>
                 <a:ext uri="{91240B29-F687-4f45-9708-019B960494DF}">
-                  <a14:hiddenLine xmlns:a14="http://schemas.microsoft.com/office/drawing/2010/main" xmlns="" w="9525">
+                  <a14:hiddenLine xmlns="" xmlns:a14="http://schemas.microsoft.com/office/drawing/2010/main" w="9525">
                     <a:solidFill>
                       <a:srgbClr val="000000"/>
                     </a:solidFill>
@@ -11009,7 +11010,7 @@
               </a:ln>
               <a:extLst>
                 <a:ext uri="{91240B29-F687-4f45-9708-019B960494DF}">
-                  <a14:hiddenLine xmlns:a14="http://schemas.microsoft.com/office/drawing/2010/main" xmlns="" w="9525">
+                  <a14:hiddenLine xmlns="" xmlns:a14="http://schemas.microsoft.com/office/drawing/2010/main" w="9525">
                     <a:solidFill>
                       <a:srgbClr val="000000"/>
                     </a:solidFill>
@@ -11090,7 +11091,7 @@
               </a:ln>
               <a:extLst>
                 <a:ext uri="{91240B29-F687-4f45-9708-019B960494DF}">
-                  <a14:hiddenLine xmlns:a14="http://schemas.microsoft.com/office/drawing/2010/main" xmlns="" w="9525">
+                  <a14:hiddenLine xmlns="" xmlns:a14="http://schemas.microsoft.com/office/drawing/2010/main" w="9525">
                     <a:solidFill>
                       <a:srgbClr val="000000"/>
                     </a:solidFill>
@@ -11205,7 +11206,7 @@
               </a:ln>
               <a:extLst>
                 <a:ext uri="{91240B29-F687-4f45-9708-019B960494DF}">
-                  <a14:hiddenLine xmlns:a14="http://schemas.microsoft.com/office/drawing/2010/main" xmlns="" w="9525">
+                  <a14:hiddenLine xmlns="" xmlns:a14="http://schemas.microsoft.com/office/drawing/2010/main" w="9525">
                     <a:solidFill>
                       <a:srgbClr val="000000"/>
                     </a:solidFill>
@@ -11295,7 +11296,7 @@
               </a:ln>
               <a:extLst>
                 <a:ext uri="{91240B29-F687-4f45-9708-019B960494DF}">
-                  <a14:hiddenLine xmlns:a14="http://schemas.microsoft.com/office/drawing/2010/main" xmlns="" w="9525">
+                  <a14:hiddenLine xmlns="" xmlns:a14="http://schemas.microsoft.com/office/drawing/2010/main" w="9525">
                     <a:solidFill>
                       <a:srgbClr val="000000"/>
                     </a:solidFill>
@@ -11360,7 +11361,7 @@
               </a:ln>
               <a:extLst>
                 <a:ext uri="{91240B29-F687-4f45-9708-019B960494DF}">
-                  <a14:hiddenLine xmlns:a14="http://schemas.microsoft.com/office/drawing/2010/main" xmlns="" w="9525">
+                  <a14:hiddenLine xmlns="" xmlns:a14="http://schemas.microsoft.com/office/drawing/2010/main" w="9525">
                     <a:solidFill>
                       <a:srgbClr val="000000"/>
                     </a:solidFill>
@@ -11450,7 +11451,7 @@
               </a:ln>
               <a:extLst>
                 <a:ext uri="{91240B29-F687-4f45-9708-019B960494DF}">
-                  <a14:hiddenLine xmlns:a14="http://schemas.microsoft.com/office/drawing/2010/main" xmlns="" w="9525">
+                  <a14:hiddenLine xmlns="" xmlns:a14="http://schemas.microsoft.com/office/drawing/2010/main" w="9525">
                     <a:solidFill>
                       <a:srgbClr val="000000"/>
                     </a:solidFill>
@@ -11518,7 +11519,7 @@
               </a:ln>
               <a:extLst>
                 <a:ext uri="{91240B29-F687-4f45-9708-019B960494DF}">
-                  <a14:hiddenLine xmlns:a14="http://schemas.microsoft.com/office/drawing/2010/main" xmlns="" w="9525">
+                  <a14:hiddenLine xmlns="" xmlns:a14="http://schemas.microsoft.com/office/drawing/2010/main" w="9525">
                     <a:solidFill>
                       <a:srgbClr val="000000"/>
                     </a:solidFill>
@@ -11608,7 +11609,7 @@
               </a:ln>
               <a:extLst>
                 <a:ext uri="{91240B29-F687-4f45-9708-019B960494DF}">
-                  <a14:hiddenLine xmlns:a14="http://schemas.microsoft.com/office/drawing/2010/main" xmlns="" w="9525">
+                  <a14:hiddenLine xmlns="" xmlns:a14="http://schemas.microsoft.com/office/drawing/2010/main" w="9525">
                     <a:solidFill>
                       <a:srgbClr val="000000"/>
                     </a:solidFill>
@@ -11676,7 +11677,7 @@
               </a:ln>
               <a:extLst>
                 <a:ext uri="{91240B29-F687-4f45-9708-019B960494DF}">
-                  <a14:hiddenLine xmlns:a14="http://schemas.microsoft.com/office/drawing/2010/main" xmlns="" w="9525">
+                  <a14:hiddenLine xmlns="" xmlns:a14="http://schemas.microsoft.com/office/drawing/2010/main" w="9525">
                     <a:solidFill>
                       <a:srgbClr val="000000"/>
                     </a:solidFill>
@@ -11766,7 +11767,7 @@
               </a:ln>
               <a:extLst>
                 <a:ext uri="{91240B29-F687-4f45-9708-019B960494DF}">
-                  <a14:hiddenLine xmlns:a14="http://schemas.microsoft.com/office/drawing/2010/main" xmlns="" w="9525">
+                  <a14:hiddenLine xmlns="" xmlns:a14="http://schemas.microsoft.com/office/drawing/2010/main" w="9525">
                     <a:solidFill>
                       <a:srgbClr val="000000"/>
                     </a:solidFill>
@@ -11800,7 +11801,7 @@
               </a:ln>
               <a:extLst>
                 <a:ext uri="{91240B29-F687-4f45-9708-019B960494DF}">
-                  <a14:hiddenLine xmlns:a14="http://schemas.microsoft.com/office/drawing/2010/main" xmlns="" w="9525">
+                  <a14:hiddenLine xmlns="" xmlns:a14="http://schemas.microsoft.com/office/drawing/2010/main" w="9525">
                     <a:solidFill>
                       <a:srgbClr val="000000"/>
                     </a:solidFill>
@@ -11941,7 +11942,7 @@
             <a:fld id="{48A87A34-81AB-432B-8DAE-1953F412C126}" type="datetimeFigureOut">
               <a:rPr lang="en-US" dirty="0"/>
               <a:pPr/>
-              <a:t>12/16/2021</a:t>
+              <a:t>12/22/2021</a:t>
             </a:fld>
             <a:endParaRPr lang="en-US" dirty="0"/>
           </a:p>
@@ -13921,6 +13922,487 @@
       </p:grpSpPr>
       <p:cxnSp>
         <p:nvCxnSpPr>
+          <p:cNvPr id="10" name="Straight Connector 9">
+            <a:extLst>
+              <a:ext uri="{FF2B5EF4-FFF2-40B4-BE49-F238E27FC236}">
+                <a16:creationId xmlns:a16="http://schemas.microsoft.com/office/drawing/2014/main" id="{BB3DF1AC-E6D2-41BA-9ED9-9A5FF7236026}"/>
+              </a:ext>
+            </a:extLst>
+          </p:cNvPr>
+          <p:cNvCxnSpPr/>
+          <p:nvPr/>
+        </p:nvCxnSpPr>
+        <p:spPr>
+          <a:xfrm flipV="1">
+            <a:off x="39200" y="977657"/>
+            <a:ext cx="4874176" cy="2"/>
+          </a:xfrm>
+          <a:prstGeom prst="line">
+            <a:avLst/>
+          </a:prstGeom>
+          <a:ln>
+            <a:solidFill>
+              <a:schemeClr val="accent2">
+                <a:lumMod val="20000"/>
+                <a:lumOff val="80000"/>
+              </a:schemeClr>
+            </a:solidFill>
+          </a:ln>
+        </p:spPr>
+        <p:style>
+          <a:lnRef idx="1">
+            <a:schemeClr val="accent1"/>
+          </a:lnRef>
+          <a:fillRef idx="0">
+            <a:schemeClr val="accent1"/>
+          </a:fillRef>
+          <a:effectRef idx="0">
+            <a:schemeClr val="accent1"/>
+          </a:effectRef>
+          <a:fontRef idx="minor">
+            <a:schemeClr val="tx1"/>
+          </a:fontRef>
+        </p:style>
+      </p:cxnSp>
+      <p:sp>
+        <p:nvSpPr>
+          <p:cNvPr id="11" name="TextBox 10">
+            <a:extLst>
+              <a:ext uri="{FF2B5EF4-FFF2-40B4-BE49-F238E27FC236}">
+                <a16:creationId xmlns:a16="http://schemas.microsoft.com/office/drawing/2014/main" id="{B86666DC-E295-49AD-818C-7A197D57F242}"/>
+              </a:ext>
+            </a:extLst>
+          </p:cNvPr>
+          <p:cNvSpPr txBox="1"/>
+          <p:nvPr/>
+        </p:nvSpPr>
+        <p:spPr>
+          <a:xfrm>
+            <a:off x="526605" y="331326"/>
+            <a:ext cx="9079033" cy="646331"/>
+          </a:xfrm>
+          <a:prstGeom prst="rect">
+            <a:avLst/>
+          </a:prstGeom>
+          <a:noFill/>
+        </p:spPr>
+        <p:txBody>
+          <a:bodyPr wrap="square" rtlCol="0">
+            <a:spAutoFit/>
+          </a:bodyPr>
+          <a:lstStyle/>
+          <a:p>
+            <a:pPr algn="just"/>
+            <a:r>
+              <a:rPr lang="en-US" sz="3600" b="1" dirty="0">
+                <a:solidFill>
+                  <a:schemeClr val="accent1">
+                    <a:lumMod val="20000"/>
+                    <a:lumOff val="80000"/>
+                  </a:schemeClr>
+                </a:solidFill>
+                <a:cs typeface="Times New Roman" panose="02020603050405020304" pitchFamily="18" charset="0"/>
+              </a:rPr>
+              <a:t>8.	Deployment </a:t>
+            </a:r>
+            <a:r>
+              <a:rPr lang="en-US" sz="3600" b="1" dirty="0" err="1">
+                <a:solidFill>
+                  <a:schemeClr val="accent1">
+                    <a:lumMod val="20000"/>
+                    <a:lumOff val="80000"/>
+                  </a:schemeClr>
+                </a:solidFill>
+                <a:cs typeface="Times New Roman" panose="02020603050405020304" pitchFamily="18" charset="0"/>
+              </a:rPr>
+              <a:t>trong</a:t>
+            </a:r>
+            <a:r>
+              <a:rPr lang="en-US" sz="3600" b="1" dirty="0">
+                <a:solidFill>
+                  <a:schemeClr val="accent1">
+                    <a:lumMod val="20000"/>
+                    <a:lumOff val="80000"/>
+                  </a:schemeClr>
+                </a:solidFill>
+                <a:cs typeface="Times New Roman" panose="02020603050405020304" pitchFamily="18" charset="0"/>
+              </a:rPr>
+              <a:t> Kubernetes</a:t>
+            </a:r>
+            <a:endParaRPr lang="en-US" sz="3600" b="1" dirty="0">
+              <a:solidFill>
+                <a:schemeClr val="accent1">
+                  <a:lumMod val="20000"/>
+                  <a:lumOff val="80000"/>
+                </a:schemeClr>
+              </a:solidFill>
+              <a:latin typeface="Arial" panose="020B0604020202020204" pitchFamily="34" charset="0"/>
+              <a:cs typeface="Arial" panose="020B0604020202020204" pitchFamily="34" charset="0"/>
+            </a:endParaRPr>
+          </a:p>
+        </p:txBody>
+      </p:sp>
+      <p:sp>
+        <p:nvSpPr>
+          <p:cNvPr id="12" name="TextBox 11">
+            <a:extLst>
+              <a:ext uri="{FF2B5EF4-FFF2-40B4-BE49-F238E27FC236}">
+                <a16:creationId xmlns:a16="http://schemas.microsoft.com/office/drawing/2014/main" id="{CD000D9A-2F28-426D-BD3E-16246208E7B5}"/>
+              </a:ext>
+            </a:extLst>
+          </p:cNvPr>
+          <p:cNvSpPr txBox="1"/>
+          <p:nvPr/>
+        </p:nvSpPr>
+        <p:spPr>
+          <a:xfrm>
+            <a:off x="526605" y="1510388"/>
+            <a:ext cx="10614870" cy="1661993"/>
+          </a:xfrm>
+          <a:prstGeom prst="rect">
+            <a:avLst/>
+          </a:prstGeom>
+          <a:noFill/>
+        </p:spPr>
+        <p:txBody>
+          <a:bodyPr wrap="square" rtlCol="0">
+            <a:spAutoFit/>
+          </a:bodyPr>
+          <a:lstStyle/>
+          <a:p>
+            <a:pPr marL="457200" indent="-457200" eaLnBrk="0" fontAlgn="base" hangingPunct="0">
+              <a:spcBef>
+                <a:spcPct val="0"/>
+              </a:spcBef>
+              <a:spcAft>
+                <a:spcPct val="0"/>
+              </a:spcAft>
+              <a:buFont typeface="Arial" panose="020B0604020202020204" pitchFamily="34" charset="0"/>
+              <a:buChar char="•"/>
+            </a:pPr>
+            <a:r>
+              <a:rPr lang="en-US" dirty="0" err="1"/>
+              <a:t>Thực</a:t>
+            </a:r>
+            <a:r>
+              <a:rPr lang="en-US" dirty="0"/>
+              <a:t> </a:t>
+            </a:r>
+            <a:r>
+              <a:rPr lang="en-US" dirty="0" err="1"/>
+              <a:t>hiện</a:t>
+            </a:r>
+            <a:r>
+              <a:rPr lang="en-US" dirty="0"/>
+              <a:t> </a:t>
+            </a:r>
+            <a:r>
+              <a:rPr lang="en-US" dirty="0" err="1"/>
+              <a:t>tạo</a:t>
+            </a:r>
+            <a:r>
+              <a:rPr lang="en-US" dirty="0"/>
+              <a:t> service </a:t>
+            </a:r>
+            <a:r>
+              <a:rPr lang="en-US" dirty="0" err="1"/>
+              <a:t>và</a:t>
+            </a:r>
+            <a:r>
+              <a:rPr lang="en-US" dirty="0"/>
+              <a:t> deployment image</a:t>
+            </a:r>
+          </a:p>
+          <a:p>
+            <a:pPr marL="457200" indent="-457200" eaLnBrk="0" fontAlgn="base" hangingPunct="0">
+              <a:spcBef>
+                <a:spcPct val="0"/>
+              </a:spcBef>
+              <a:spcAft>
+                <a:spcPct val="0"/>
+              </a:spcAft>
+              <a:buFont typeface="Arial" panose="020B0604020202020204" pitchFamily="34" charset="0"/>
+              <a:buChar char="•"/>
+            </a:pPr>
+            <a:endParaRPr lang="en-US" dirty="0"/>
+          </a:p>
+          <a:p>
+            <a:pPr marL="457200" indent="-457200" eaLnBrk="0" fontAlgn="base" hangingPunct="0">
+              <a:spcBef>
+                <a:spcPct val="0"/>
+              </a:spcBef>
+              <a:spcAft>
+                <a:spcPct val="0"/>
+              </a:spcAft>
+              <a:buFont typeface="Arial" panose="020B0604020202020204" pitchFamily="34" charset="0"/>
+              <a:buChar char="•"/>
+            </a:pPr>
+            <a:endParaRPr lang="en-US" dirty="0"/>
+          </a:p>
+          <a:p>
+            <a:pPr marL="457200" indent="-457200" eaLnBrk="0" fontAlgn="base" hangingPunct="0">
+              <a:lnSpc>
+                <a:spcPct val="100000"/>
+              </a:lnSpc>
+              <a:spcBef>
+                <a:spcPct val="0"/>
+              </a:spcBef>
+              <a:spcAft>
+                <a:spcPct val="0"/>
+              </a:spcAft>
+              <a:buFont typeface="Arial" panose="020B0604020202020204" pitchFamily="34" charset="0"/>
+              <a:buChar char="•"/>
+            </a:pPr>
+            <a:endParaRPr lang="en-US" altLang="en-US" sz="2400" dirty="0">
+              <a:solidFill>
+                <a:schemeClr val="accent1">
+                  <a:lumMod val="20000"/>
+                  <a:lumOff val="80000"/>
+                </a:schemeClr>
+              </a:solidFill>
+              <a:latin typeface="Arial" panose="020B0604020202020204" pitchFamily="34" charset="0"/>
+              <a:ea typeface="Tahoma" panose="020B0604030504040204" pitchFamily="34" charset="0"/>
+              <a:cs typeface="Arial" panose="020B0604020202020204" pitchFamily="34" charset="0"/>
+            </a:endParaRPr>
+          </a:p>
+          <a:p>
+            <a:pPr marL="457200" indent="-457200" eaLnBrk="0" fontAlgn="base" hangingPunct="0">
+              <a:lnSpc>
+                <a:spcPct val="100000"/>
+              </a:lnSpc>
+              <a:spcBef>
+                <a:spcPct val="0"/>
+              </a:spcBef>
+              <a:spcAft>
+                <a:spcPct val="0"/>
+              </a:spcAft>
+              <a:buFont typeface="Arial" panose="020B0604020202020204" pitchFamily="34" charset="0"/>
+              <a:buChar char="•"/>
+            </a:pPr>
+            <a:endParaRPr lang="en-US" altLang="en-US" sz="2400" dirty="0">
+              <a:solidFill>
+                <a:schemeClr val="accent1">
+                  <a:lumMod val="20000"/>
+                  <a:lumOff val="80000"/>
+                </a:schemeClr>
+              </a:solidFill>
+              <a:latin typeface="Arial" panose="020B0604020202020204" pitchFamily="34" charset="0"/>
+              <a:ea typeface="Tahoma" panose="020B0604030504040204" pitchFamily="34" charset="0"/>
+              <a:cs typeface="Arial" panose="020B0604020202020204" pitchFamily="34" charset="0"/>
+            </a:endParaRPr>
+          </a:p>
+        </p:txBody>
+      </p:sp>
+      <p:sp>
+        <p:nvSpPr>
+          <p:cNvPr id="13" name="TextBox 12">
+            <a:extLst>
+              <a:ext uri="{FF2B5EF4-FFF2-40B4-BE49-F238E27FC236}">
+                <a16:creationId xmlns:a16="http://schemas.microsoft.com/office/drawing/2014/main" id="{009FD194-C9DE-4B69-9E3A-A3BA0F140EEF}"/>
+              </a:ext>
+            </a:extLst>
+          </p:cNvPr>
+          <p:cNvSpPr txBox="1"/>
+          <p:nvPr/>
+        </p:nvSpPr>
+        <p:spPr>
+          <a:xfrm>
+            <a:off x="11643360" y="281476"/>
+            <a:ext cx="390144" cy="523220"/>
+          </a:xfrm>
+          <a:prstGeom prst="rect">
+            <a:avLst/>
+          </a:prstGeom>
+          <a:noFill/>
+        </p:spPr>
+        <p:txBody>
+          <a:bodyPr wrap="square" rtlCol="0">
+            <a:spAutoFit/>
+          </a:bodyPr>
+          <a:lstStyle/>
+          <a:p>
+            <a:r>
+              <a:rPr lang="en-US" sz="2800" dirty="0"/>
+              <a:t>9</a:t>
+            </a:r>
+            <a:endParaRPr lang="vi-VN" sz="2800" dirty="0"/>
+          </a:p>
+        </p:txBody>
+      </p:sp>
+      <p:pic>
+        <p:nvPicPr>
+          <p:cNvPr id="16" name="Picture 15">
+            <a:extLst>
+              <a:ext uri="{FF2B5EF4-FFF2-40B4-BE49-F238E27FC236}">
+                <a16:creationId xmlns:a16="http://schemas.microsoft.com/office/drawing/2014/main" id="{7D609885-2678-48E8-AD35-61C3641A7010}"/>
+              </a:ext>
+            </a:extLst>
+          </p:cNvPr>
+          <p:cNvPicPr/>
+          <p:nvPr/>
+        </p:nvPicPr>
+        <p:blipFill>
+          <a:blip r:embed="rId2"/>
+          <a:stretch>
+            <a:fillRect/>
+          </a:stretch>
+        </p:blipFill>
+        <p:spPr>
+          <a:xfrm>
+            <a:off x="960712" y="2213598"/>
+            <a:ext cx="5760720" cy="1022441"/>
+          </a:xfrm>
+          <a:prstGeom prst="rect">
+            <a:avLst/>
+          </a:prstGeom>
+        </p:spPr>
+      </p:pic>
+      <p:pic>
+        <p:nvPicPr>
+          <p:cNvPr id="17" name="Picture 16">
+            <a:extLst>
+              <a:ext uri="{FF2B5EF4-FFF2-40B4-BE49-F238E27FC236}">
+                <a16:creationId xmlns:a16="http://schemas.microsoft.com/office/drawing/2014/main" id="{69A7F11E-7D81-45A1-A67F-0E1434D32168}"/>
+              </a:ext>
+            </a:extLst>
+          </p:cNvPr>
+          <p:cNvPicPr/>
+          <p:nvPr/>
+        </p:nvPicPr>
+        <p:blipFill>
+          <a:blip r:embed="rId3"/>
+          <a:stretch>
+            <a:fillRect/>
+          </a:stretch>
+        </p:blipFill>
+        <p:spPr>
+          <a:xfrm>
+            <a:off x="960712" y="3685620"/>
+            <a:ext cx="5760720" cy="2336165"/>
+          </a:xfrm>
+          <a:prstGeom prst="rect">
+            <a:avLst/>
+          </a:prstGeom>
+        </p:spPr>
+      </p:pic>
+    </p:spTree>
+    <p:extLst>
+      <p:ext uri="{BB962C8B-B14F-4D97-AF65-F5344CB8AC3E}">
+        <p14:creationId xmlns:p14="http://schemas.microsoft.com/office/powerpoint/2010/main" val="1094535426"/>
+      </p:ext>
+    </p:extLst>
+  </p:cSld>
+  <p:clrMapOvr>
+    <a:masterClrMapping/>
+  </p:clrMapOvr>
+  <p:timing>
+    <p:tnLst>
+      <p:par>
+        <p:cTn id="1" dur="indefinite" restart="never" nodeType="tmRoot">
+          <p:childTnLst>
+            <p:seq concurrent="1" nextAc="seek">
+              <p:cTn id="2" dur="indefinite" nodeType="mainSeq">
+                <p:childTnLst>
+                  <p:par>
+                    <p:cTn id="3" fill="hold">
+                      <p:stCondLst>
+                        <p:cond delay="indefinite"/>
+                      </p:stCondLst>
+                      <p:childTnLst>
+                        <p:par>
+                          <p:cTn id="4" fill="hold">
+                            <p:stCondLst>
+                              <p:cond delay="0"/>
+                            </p:stCondLst>
+                            <p:childTnLst>
+                              <p:par>
+                                <p:cTn id="5" presetID="6" presetClass="entr" presetSubtype="16" fill="hold" grpId="0" nodeType="clickEffect">
+                                  <p:stCondLst>
+                                    <p:cond delay="0"/>
+                                  </p:stCondLst>
+                                  <p:childTnLst>
+                                    <p:set>
+                                      <p:cBhvr>
+                                        <p:cTn id="6" dur="1" fill="hold">
+                                          <p:stCondLst>
+                                            <p:cond delay="0"/>
+                                          </p:stCondLst>
+                                        </p:cTn>
+                                        <p:tgtEl>
+                                          <p:spTgt spid="12"/>
+                                        </p:tgtEl>
+                                        <p:attrNameLst>
+                                          <p:attrName>style.visibility</p:attrName>
+                                        </p:attrNameLst>
+                                      </p:cBhvr>
+                                      <p:to>
+                                        <p:strVal val="visible"/>
+                                      </p:to>
+                                    </p:set>
+                                    <p:animEffect transition="in" filter="circle(in)">
+                                      <p:cBhvr>
+                                        <p:cTn id="7" dur="2000"/>
+                                        <p:tgtEl>
+                                          <p:spTgt spid="12"/>
+                                        </p:tgtEl>
+                                      </p:cBhvr>
+                                    </p:animEffect>
+                                  </p:childTnLst>
+                                </p:cTn>
+                              </p:par>
+                            </p:childTnLst>
+                          </p:cTn>
+                        </p:par>
+                      </p:childTnLst>
+                    </p:cTn>
+                  </p:par>
+                </p:childTnLst>
+              </p:cTn>
+              <p:prevCondLst>
+                <p:cond evt="onPrev" delay="0">
+                  <p:tgtEl>
+                    <p:sldTgt/>
+                  </p:tgtEl>
+                </p:cond>
+              </p:prevCondLst>
+              <p:nextCondLst>
+                <p:cond evt="onNext" delay="0">
+                  <p:tgtEl>
+                    <p:sldTgt/>
+                  </p:tgtEl>
+                </p:cond>
+              </p:nextCondLst>
+            </p:seq>
+          </p:childTnLst>
+        </p:cTn>
+      </p:par>
+    </p:tnLst>
+    <p:bldLst>
+      <p:bldP spid="12" grpId="0"/>
+    </p:bldLst>
+  </p:timing>
+</p:sld>
+</file>
+
+<file path=ppt/slides/slide12.xml><?xml version="1.0" encoding="utf-8"?>
+<p:sld xmlns:a="http://schemas.openxmlformats.org/drawingml/2006/main" xmlns:r="http://schemas.openxmlformats.org/officeDocument/2006/relationships" xmlns:p="http://schemas.openxmlformats.org/presentationml/2006/main">
+  <p:cSld>
+    <p:spTree>
+      <p:nvGrpSpPr>
+        <p:cNvPr id="1" name=""/>
+        <p:cNvGrpSpPr/>
+        <p:nvPr/>
+      </p:nvGrpSpPr>
+      <p:grpSpPr>
+        <a:xfrm>
+          <a:off x="0" y="0"/>
+          <a:ext cx="0" cy="0"/>
+          <a:chOff x="0" y="0"/>
+          <a:chExt cx="0" cy="0"/>
+        </a:xfrm>
+      </p:grpSpPr>
+      <p:cxnSp>
+        <p:nvCxnSpPr>
           <p:cNvPr id="5" name="Straight Connector 4"/>
           <p:cNvCxnSpPr/>
           <p:nvPr/>
@@ -14334,7 +14816,7 @@
 </p:sld>
 </file>
 
-<file path=ppt/slides/slide12.xml><?xml version="1.0" encoding="utf-8"?>
+<file path=ppt/slides/slide13.xml><?xml version="1.0" encoding="utf-8"?>
 <p:sld xmlns:a="http://schemas.openxmlformats.org/drawingml/2006/main" xmlns:r="http://schemas.openxmlformats.org/officeDocument/2006/relationships" xmlns:p="http://schemas.openxmlformats.org/presentationml/2006/main">
   <p:cSld>
     <p:spTree>
@@ -14714,7 +15196,7 @@
 </p:sld>
 </file>
 
-<file path=ppt/slides/slide13.xml><?xml version="1.0" encoding="utf-8"?>
+<file path=ppt/slides/slide14.xml><?xml version="1.0" encoding="utf-8"?>
 <p:sld xmlns:a="http://schemas.openxmlformats.org/drawingml/2006/main" xmlns:r="http://schemas.openxmlformats.org/officeDocument/2006/relationships" xmlns:p="http://schemas.openxmlformats.org/presentationml/2006/main">
   <p:cSld>
     <p:spTree>
@@ -16571,7 +17053,7 @@
 </p:sld>
 </file>
 
-<file path=ppt/slides/slide14.xml><?xml version="1.0" encoding="utf-8"?>
+<file path=ppt/slides/slide15.xml><?xml version="1.0" encoding="utf-8"?>
 <p:sld xmlns:a="http://schemas.openxmlformats.org/drawingml/2006/main" xmlns:r="http://schemas.openxmlformats.org/officeDocument/2006/relationships" xmlns:p="http://schemas.openxmlformats.org/presentationml/2006/main">
   <p:cSld>
     <p:spTree>

</xml_diff>